<commit_message>
Built site for jfa: 0.7.1@a9f5db2
</commit_message>
<xml_diff>
--- a/reference/figures/cheatsheet/cheatsheet-data.pptx
+++ b/reference/figures/cheatsheet/cheatsheet-data.pptx
@@ -441,6 +441,52 @@
     </pc:docChg>
   </pc:docChgLst>
   <pc:docChgLst>
+    <pc:chgData name="Derks, Koen" userId="42903d96-be75-4cec-9136-f3710e86cd30" providerId="ADAL" clId="{76736121-1439-4CC5-B71A-43EA3D14E7B7}"/>
+    <pc:docChg chg="delSld modSld">
+      <pc:chgData name="Derks, Koen" userId="42903d96-be75-4cec-9136-f3710e86cd30" providerId="ADAL" clId="{76736121-1439-4CC5-B71A-43EA3D14E7B7}" dt="2020-11-28T22:53:19.244" v="23" actId="20577"/>
+      <pc:docMkLst>
+        <pc:docMk/>
+      </pc:docMkLst>
+      <pc:sldChg chg="del">
+        <pc:chgData name="Derks, Koen" userId="42903d96-be75-4cec-9136-f3710e86cd30" providerId="ADAL" clId="{76736121-1439-4CC5-B71A-43EA3D14E7B7}" dt="2020-11-28T22:52:40.993" v="0" actId="47"/>
+        <pc:sldMkLst>
+          <pc:docMk/>
+          <pc:sldMk cId="0" sldId="256"/>
+        </pc:sldMkLst>
+      </pc:sldChg>
+      <pc:sldChg chg="modSp mod">
+        <pc:chgData name="Derks, Koen" userId="42903d96-be75-4cec-9136-f3710e86cd30" providerId="ADAL" clId="{76736121-1439-4CC5-B71A-43EA3D14E7B7}" dt="2020-11-28T22:53:19.244" v="23" actId="20577"/>
+        <pc:sldMkLst>
+          <pc:docMk/>
+          <pc:sldMk cId="0" sldId="257"/>
+        </pc:sldMkLst>
+        <pc:spChg chg="mod">
+          <ac:chgData name="Derks, Koen" userId="42903d96-be75-4cec-9136-f3710e86cd30" providerId="ADAL" clId="{76736121-1439-4CC5-B71A-43EA3D14E7B7}" dt="2020-11-28T22:53:19.244" v="23" actId="20577"/>
+          <ac:spMkLst>
+            <pc:docMk/>
+            <pc:sldMk cId="0" sldId="257"/>
+            <ac:spMk id="334" creationId="{00000000-0000-0000-0000-000000000000}"/>
+          </ac:spMkLst>
+        </pc:spChg>
+      </pc:sldChg>
+      <pc:sldMasterChg chg="delSldLayout">
+        <pc:chgData name="Derks, Koen" userId="42903d96-be75-4cec-9136-f3710e86cd30" providerId="ADAL" clId="{76736121-1439-4CC5-B71A-43EA3D14E7B7}" dt="2020-11-28T22:52:40.993" v="0" actId="47"/>
+        <pc:sldMasterMkLst>
+          <pc:docMk/>
+          <pc:sldMasterMk cId="0" sldId="2147483648"/>
+        </pc:sldMasterMkLst>
+        <pc:sldLayoutChg chg="del">
+          <pc:chgData name="Derks, Koen" userId="42903d96-be75-4cec-9136-f3710e86cd30" providerId="ADAL" clId="{76736121-1439-4CC5-B71A-43EA3D14E7B7}" dt="2020-11-28T22:52:40.993" v="0" actId="47"/>
+          <pc:sldLayoutMkLst>
+            <pc:docMk/>
+            <pc:sldMasterMk cId="0" sldId="2147483648"/>
+            <pc:sldLayoutMk cId="0" sldId="2147483661"/>
+          </pc:sldLayoutMkLst>
+        </pc:sldLayoutChg>
+      </pc:sldMasterChg>
+    </pc:docChg>
+  </pc:docChgLst>
+  <pc:docChgLst>
     <pc:chgData name="Derks, Koen" userId="42903d96-be75-4cec-9136-f3710e86cd30" providerId="ADAL" clId="{B2C99C48-803B-45C3-BEC8-064BF2898A74}"/>
     <pc:docChg chg="custSel modSld">
       <pc:chgData name="Derks, Koen" userId="42903d96-be75-4cec-9136-f3710e86cd30" providerId="ADAL" clId="{B2C99C48-803B-45C3-BEC8-064BF2898A74}" dt="2021-09-18T11:38:05.739" v="101"/>
@@ -486,52 +532,6 @@
           </ac:spMkLst>
         </pc:spChg>
       </pc:sldChg>
-    </pc:docChg>
-  </pc:docChgLst>
-  <pc:docChgLst>
-    <pc:chgData name="Derks, Koen" userId="42903d96-be75-4cec-9136-f3710e86cd30" providerId="ADAL" clId="{76736121-1439-4CC5-B71A-43EA3D14E7B7}"/>
-    <pc:docChg chg="delSld modSld">
-      <pc:chgData name="Derks, Koen" userId="42903d96-be75-4cec-9136-f3710e86cd30" providerId="ADAL" clId="{76736121-1439-4CC5-B71A-43EA3D14E7B7}" dt="2020-11-28T22:53:19.244" v="23" actId="20577"/>
-      <pc:docMkLst>
-        <pc:docMk/>
-      </pc:docMkLst>
-      <pc:sldChg chg="del">
-        <pc:chgData name="Derks, Koen" userId="42903d96-be75-4cec-9136-f3710e86cd30" providerId="ADAL" clId="{76736121-1439-4CC5-B71A-43EA3D14E7B7}" dt="2020-11-28T22:52:40.993" v="0" actId="47"/>
-        <pc:sldMkLst>
-          <pc:docMk/>
-          <pc:sldMk cId="0" sldId="256"/>
-        </pc:sldMkLst>
-      </pc:sldChg>
-      <pc:sldChg chg="modSp mod">
-        <pc:chgData name="Derks, Koen" userId="42903d96-be75-4cec-9136-f3710e86cd30" providerId="ADAL" clId="{76736121-1439-4CC5-B71A-43EA3D14E7B7}" dt="2020-11-28T22:53:19.244" v="23" actId="20577"/>
-        <pc:sldMkLst>
-          <pc:docMk/>
-          <pc:sldMk cId="0" sldId="257"/>
-        </pc:sldMkLst>
-        <pc:spChg chg="mod">
-          <ac:chgData name="Derks, Koen" userId="42903d96-be75-4cec-9136-f3710e86cd30" providerId="ADAL" clId="{76736121-1439-4CC5-B71A-43EA3D14E7B7}" dt="2020-11-28T22:53:19.244" v="23" actId="20577"/>
-          <ac:spMkLst>
-            <pc:docMk/>
-            <pc:sldMk cId="0" sldId="257"/>
-            <ac:spMk id="334" creationId="{00000000-0000-0000-0000-000000000000}"/>
-          </ac:spMkLst>
-        </pc:spChg>
-      </pc:sldChg>
-      <pc:sldMasterChg chg="delSldLayout">
-        <pc:chgData name="Derks, Koen" userId="42903d96-be75-4cec-9136-f3710e86cd30" providerId="ADAL" clId="{76736121-1439-4CC5-B71A-43EA3D14E7B7}" dt="2020-11-28T22:52:40.993" v="0" actId="47"/>
-        <pc:sldMasterMkLst>
-          <pc:docMk/>
-          <pc:sldMasterMk cId="0" sldId="2147483648"/>
-        </pc:sldMasterMkLst>
-        <pc:sldLayoutChg chg="del">
-          <pc:chgData name="Derks, Koen" userId="42903d96-be75-4cec-9136-f3710e86cd30" providerId="ADAL" clId="{76736121-1439-4CC5-B71A-43EA3D14E7B7}" dt="2020-11-28T22:52:40.993" v="0" actId="47"/>
-          <pc:sldLayoutMkLst>
-            <pc:docMk/>
-            <pc:sldMasterMk cId="0" sldId="2147483648"/>
-            <pc:sldLayoutMk cId="0" sldId="2147483661"/>
-          </pc:sldLayoutMkLst>
-        </pc:sldLayoutChg>
-      </pc:sldMasterChg>
     </pc:docChg>
   </pc:docChgLst>
   <pc:docChgLst>
@@ -2711,7 +2711,7 @@
           </a:ln>
           <a:extLst>
             <a:ext uri="{C572A759-6A51-4108-AA02-DFA0A04FC94B}">
-              <ma14:wrappingTextBoxFlag xmlns:ma14="http://schemas.microsoft.com/office/mac/drawingml/2011/main" xmlns:a14="http://schemas.microsoft.com/office/drawing/2010/main" xmlns:m="http://schemas.openxmlformats.org/officeDocument/2006/math" xmlns="" val="1"/>
+              <ma14:wrappingTextBoxFlag xmlns="" xmlns:m="http://schemas.openxmlformats.org/officeDocument/2006/math" xmlns:a14="http://schemas.microsoft.com/office/drawing/2010/main" xmlns:ma14="http://schemas.microsoft.com/office/mac/drawingml/2011/main" val="1"/>
             </a:ext>
           </a:extLst>
         </p:spPr>
@@ -2750,7 +2750,7 @@
           </a:ln>
           <a:extLst>
             <a:ext uri="{C572A759-6A51-4108-AA02-DFA0A04FC94B}">
-              <ma14:wrappingTextBoxFlag xmlns:ma14="http://schemas.microsoft.com/office/mac/drawingml/2011/main" xmlns:a14="http://schemas.microsoft.com/office/drawing/2010/main" xmlns:m="http://schemas.openxmlformats.org/officeDocument/2006/math" xmlns="" val="1"/>
+              <ma14:wrappingTextBoxFlag xmlns="" xmlns:m="http://schemas.openxmlformats.org/officeDocument/2006/math" xmlns:a14="http://schemas.microsoft.com/office/drawing/2010/main" xmlns:ma14="http://schemas.microsoft.com/office/mac/drawingml/2011/main" val="1"/>
             </a:ext>
           </a:extLst>
         </p:spPr>
@@ -3683,7 +3683,7 @@
         </p:nvSpPr>
         <p:spPr>
           <a:xfrm>
-            <a:off x="7021873" y="4404548"/>
+            <a:off x="7017888" y="4404548"/>
             <a:ext cx="3240000" cy="2572418"/>
           </a:xfrm>
           <a:prstGeom prst="rect">
@@ -3705,7 +3705,7 @@
           <a:effectLst/>
           <a:extLst>
             <a:ext uri="{C572A759-6A51-4108-AA02-DFA0A04FC94B}">
-              <ma14:wrappingTextBoxFlag xmlns:ma14="http://schemas.microsoft.com/office/mac/drawingml/2011/main" xmlns:a14="http://schemas.microsoft.com/office/drawing/2010/main" xmlns:m="http://schemas.openxmlformats.org/officeDocument/2006/math" xmlns="" val="1"/>
+              <ma14:wrappingTextBoxFlag xmlns="" xmlns:m="http://schemas.openxmlformats.org/officeDocument/2006/math" xmlns:a14="http://schemas.microsoft.com/office/drawing/2010/main" xmlns:ma14="http://schemas.microsoft.com/office/mac/drawingml/2011/main" val="1"/>
             </a:ext>
           </a:extLst>
         </p:spPr>
@@ -3732,38 +3732,32 @@
             <a:r>
               <a:rPr lang="nl-NL" sz="1000" dirty="0">
                 <a:solidFill>
-                  <a:schemeClr val="tx1">
-                    <a:lumMod val="50000"/>
-                  </a:schemeClr>
+                  <a:srgbClr val="4B886B"/>
                 </a:solidFill>
                 <a:latin typeface="Courier New" panose="02070309020205020404" pitchFamily="49" charset="0"/>
                 <a:cs typeface="Courier New" panose="02070309020205020404" pitchFamily="49" charset="0"/>
               </a:rPr>
-              <a:t>plot(..., type = '</a:t>
+              <a:t># </a:t>
             </a:r>
             <a:r>
               <a:rPr lang="nl-NL" sz="1000" dirty="0" err="1">
                 <a:solidFill>
-                  <a:schemeClr val="tx1">
-                    <a:lumMod val="50000"/>
-                  </a:schemeClr>
+                  <a:srgbClr val="4B886B"/>
                 </a:solidFill>
                 <a:latin typeface="Courier New" panose="02070309020205020404" pitchFamily="49" charset="0"/>
                 <a:cs typeface="Courier New" panose="02070309020205020404" pitchFamily="49" charset="0"/>
               </a:rPr>
-              <a:t>robustness</a:t>
+              <a:t>requires</a:t>
             </a:r>
             <a:r>
               <a:rPr lang="nl-NL" sz="1000" dirty="0">
                 <a:solidFill>
-                  <a:schemeClr val="tx1">
-                    <a:lumMod val="50000"/>
-                  </a:schemeClr>
+                  <a:srgbClr val="4B886B"/>
                 </a:solidFill>
                 <a:latin typeface="Courier New" panose="02070309020205020404" pitchFamily="49" charset="0"/>
                 <a:cs typeface="Courier New" panose="02070309020205020404" pitchFamily="49" charset="0"/>
               </a:rPr>
-              <a:t>')</a:t>
+              <a:t> 'prior = TRUE'</a:t>
             </a:r>
           </a:p>
           <a:p>
@@ -3781,15 +3775,42 @@
                 <a:sym typeface="Menlo"/>
               </a:defRPr>
             </a:pPr>
-            <a:endParaRPr lang="nl-NL" sz="1000" dirty="0">
-              <a:solidFill>
-                <a:schemeClr val="tx1">
-                  <a:lumMod val="50000"/>
-                </a:schemeClr>
-              </a:solidFill>
-              <a:latin typeface="Courier New" panose="02070309020205020404" pitchFamily="49" charset="0"/>
-              <a:cs typeface="Courier New" panose="02070309020205020404" pitchFamily="49" charset="0"/>
-            </a:endParaRPr>
+            <a:r>
+              <a:rPr lang="nl-NL" sz="1000" dirty="0">
+                <a:solidFill>
+                  <a:schemeClr val="tx1">
+                    <a:lumMod val="50000"/>
+                  </a:schemeClr>
+                </a:solidFill>
+                <a:latin typeface="Courier New" panose="02070309020205020404" pitchFamily="49" charset="0"/>
+                <a:cs typeface="Courier New" panose="02070309020205020404" pitchFamily="49" charset="0"/>
+              </a:rPr>
+              <a:t>plot(..., type = '</a:t>
+            </a:r>
+            <a:r>
+              <a:rPr lang="nl-NL" sz="1000" dirty="0" err="1">
+                <a:solidFill>
+                  <a:schemeClr val="tx1">
+                    <a:lumMod val="50000"/>
+                  </a:schemeClr>
+                </a:solidFill>
+                <a:latin typeface="Courier New" panose="02070309020205020404" pitchFamily="49" charset="0"/>
+                <a:cs typeface="Courier New" panose="02070309020205020404" pitchFamily="49" charset="0"/>
+              </a:rPr>
+              <a:t>robustness</a:t>
+            </a:r>
+            <a:r>
+              <a:rPr lang="nl-NL" sz="1000" dirty="0">
+                <a:solidFill>
+                  <a:schemeClr val="tx1">
+                    <a:lumMod val="50000"/>
+                  </a:schemeClr>
+                </a:solidFill>
+                <a:latin typeface="Courier New" panose="02070309020205020404" pitchFamily="49" charset="0"/>
+                <a:cs typeface="Courier New" panose="02070309020205020404" pitchFamily="49" charset="0"/>
+              </a:rPr>
+              <a:t>')</a:t>
+            </a:r>
           </a:p>
           <a:p>
             <a:pPr>
@@ -4171,15 +4192,13 @@
             </a:schemeClr>
           </a:solidFill>
           <a:ln w="12700">
-            <a:solidFill>
-              <a:schemeClr val="bg1"/>
-            </a:solidFill>
+            <a:noFill/>
             <a:miter lim="400000"/>
           </a:ln>
           <a:effectLst/>
           <a:extLst>
             <a:ext uri="{C572A759-6A51-4108-AA02-DFA0A04FC94B}">
-              <ma14:wrappingTextBoxFlag xmlns:ma14="http://schemas.microsoft.com/office/mac/drawingml/2011/main" xmlns:a14="http://schemas.microsoft.com/office/drawing/2010/main" xmlns:m="http://schemas.openxmlformats.org/officeDocument/2006/math" xmlns="" val="1"/>
+              <ma14:wrappingTextBoxFlag xmlns="" xmlns:m="http://schemas.openxmlformats.org/officeDocument/2006/math" xmlns:a14="http://schemas.microsoft.com/office/drawing/2010/main" xmlns:ma14="http://schemas.microsoft.com/office/mac/drawingml/2011/main" val="1"/>
             </a:ext>
           </a:extLst>
         </p:spPr>
@@ -4206,38 +4225,52 @@
             <a:r>
               <a:rPr lang="nl-NL" sz="1000" dirty="0">
                 <a:solidFill>
-                  <a:schemeClr val="tx1">
-                    <a:lumMod val="50000"/>
-                  </a:schemeClr>
+                  <a:srgbClr val="4B886B"/>
                 </a:solidFill>
                 <a:latin typeface="Courier New" panose="02070309020205020404" pitchFamily="49" charset="0"/>
                 <a:cs typeface="Courier New" panose="02070309020205020404" pitchFamily="49" charset="0"/>
               </a:rPr>
-              <a:t>plot(..., type = '</a:t>
+              <a:t># does </a:t>
             </a:r>
             <a:r>
               <a:rPr lang="nl-NL" sz="1000" dirty="0" err="1">
                 <a:solidFill>
-                  <a:schemeClr val="tx1">
-                    <a:lumMod val="50000"/>
-                  </a:schemeClr>
+                  <a:srgbClr val="4B886B"/>
                 </a:solidFill>
                 <a:latin typeface="Courier New" panose="02070309020205020404" pitchFamily="49" charset="0"/>
                 <a:cs typeface="Courier New" panose="02070309020205020404" pitchFamily="49" charset="0"/>
               </a:rPr>
-              <a:t>estimates</a:t>
+              <a:t>not</a:t>
             </a:r>
             <a:r>
               <a:rPr lang="nl-NL" sz="1000" dirty="0">
                 <a:solidFill>
-                  <a:schemeClr val="tx1">
-                    <a:lumMod val="50000"/>
-                  </a:schemeClr>
+                  <a:srgbClr val="4B886B"/>
                 </a:solidFill>
                 <a:latin typeface="Courier New" panose="02070309020205020404" pitchFamily="49" charset="0"/>
                 <a:cs typeface="Courier New" panose="02070309020205020404" pitchFamily="49" charset="0"/>
               </a:rPr>
-              <a:t>')</a:t>
+              <a:t> </a:t>
+            </a:r>
+            <a:r>
+              <a:rPr lang="nl-NL" sz="1000" dirty="0" err="1">
+                <a:solidFill>
+                  <a:srgbClr val="4B886B"/>
+                </a:solidFill>
+                <a:latin typeface="Courier New" panose="02070309020205020404" pitchFamily="49" charset="0"/>
+                <a:cs typeface="Courier New" panose="02070309020205020404" pitchFamily="49" charset="0"/>
+              </a:rPr>
+              <a:t>require</a:t>
+            </a:r>
+            <a:r>
+              <a:rPr lang="nl-NL" sz="1000" dirty="0">
+                <a:solidFill>
+                  <a:srgbClr val="4B886B"/>
+                </a:solidFill>
+                <a:latin typeface="Courier New" panose="02070309020205020404" pitchFamily="49" charset="0"/>
+                <a:cs typeface="Courier New" panose="02070309020205020404" pitchFamily="49" charset="0"/>
+              </a:rPr>
+              <a:t> 'prior = TRUE'</a:t>
             </a:r>
           </a:p>
           <a:p>
@@ -4255,15 +4288,42 @@
                 <a:sym typeface="Menlo"/>
               </a:defRPr>
             </a:pPr>
-            <a:endParaRPr lang="nl-NL" sz="1000" dirty="0">
-              <a:solidFill>
-                <a:schemeClr val="tx1">
-                  <a:lumMod val="50000"/>
-                </a:schemeClr>
-              </a:solidFill>
-              <a:latin typeface="Courier New" panose="02070309020205020404" pitchFamily="49" charset="0"/>
-              <a:cs typeface="Courier New" panose="02070309020205020404" pitchFamily="49" charset="0"/>
-            </a:endParaRPr>
+            <a:r>
+              <a:rPr lang="nl-NL" sz="1000" dirty="0">
+                <a:solidFill>
+                  <a:schemeClr val="tx1">
+                    <a:lumMod val="50000"/>
+                  </a:schemeClr>
+                </a:solidFill>
+                <a:latin typeface="Courier New" panose="02070309020205020404" pitchFamily="49" charset="0"/>
+                <a:cs typeface="Courier New" panose="02070309020205020404" pitchFamily="49" charset="0"/>
+              </a:rPr>
+              <a:t>plot(..., type = '</a:t>
+            </a:r>
+            <a:r>
+              <a:rPr lang="nl-NL" sz="1000" dirty="0" err="1">
+                <a:solidFill>
+                  <a:schemeClr val="tx1">
+                    <a:lumMod val="50000"/>
+                  </a:schemeClr>
+                </a:solidFill>
+                <a:latin typeface="Courier New" panose="02070309020205020404" pitchFamily="49" charset="0"/>
+                <a:cs typeface="Courier New" panose="02070309020205020404" pitchFamily="49" charset="0"/>
+              </a:rPr>
+              <a:t>estimates</a:t>
+            </a:r>
+            <a:r>
+              <a:rPr lang="nl-NL" sz="1000" dirty="0">
+                <a:solidFill>
+                  <a:schemeClr val="tx1">
+                    <a:lumMod val="50000"/>
+                  </a:schemeClr>
+                </a:solidFill>
+                <a:latin typeface="Courier New" panose="02070309020205020404" pitchFamily="49" charset="0"/>
+                <a:cs typeface="Courier New" panose="02070309020205020404" pitchFamily="49" charset="0"/>
+              </a:rPr>
+              <a:t>')</a:t>
+            </a:r>
           </a:p>
           <a:p>
             <a:pPr>
@@ -4793,7 +4853,7 @@
           </a:ln>
           <a:extLst>
             <a:ext uri="{C572A759-6A51-4108-AA02-DFA0A04FC94B}">
-              <ma14:wrappingTextBoxFlag xmlns:ma14="http://schemas.microsoft.com/office/mac/drawingml/2011/main" xmlns:a14="http://schemas.microsoft.com/office/drawing/2010/main" xmlns:m="http://schemas.openxmlformats.org/officeDocument/2006/math" xmlns="" val="1"/>
+              <ma14:wrappingTextBoxFlag xmlns="" xmlns:m="http://schemas.openxmlformats.org/officeDocument/2006/math" xmlns:a14="http://schemas.microsoft.com/office/drawing/2010/main" xmlns:ma14="http://schemas.microsoft.com/office/mac/drawingml/2011/main" val="1"/>
             </a:ext>
           </a:extLst>
         </p:spPr>
@@ -4846,7 +4906,7 @@
           </a:ln>
           <a:extLst>
             <a:ext uri="{C572A759-6A51-4108-AA02-DFA0A04FC94B}">
-              <ma14:wrappingTextBoxFlag xmlns:ma14="http://schemas.microsoft.com/office/mac/drawingml/2011/main" xmlns:a14="http://schemas.microsoft.com/office/drawing/2010/main" xmlns:m="http://schemas.openxmlformats.org/officeDocument/2006/math" xmlns="" val="1"/>
+              <ma14:wrappingTextBoxFlag xmlns="" xmlns:m="http://schemas.openxmlformats.org/officeDocument/2006/math" xmlns:a14="http://schemas.microsoft.com/office/drawing/2010/main" xmlns:ma14="http://schemas.microsoft.com/office/mac/drawingml/2011/main" val="1"/>
             </a:ext>
           </a:extLst>
         </p:spPr>
@@ -5012,13 +5072,13 @@
           </a:ln>
           <a:extLst>
             <a:ext uri="{C572A759-6A51-4108-AA02-DFA0A04FC94B}">
-              <ma14:wrappingTextBoxFlag xmlns:ma14="http://schemas.microsoft.com/office/mac/drawingml/2011/main" xmlns:a14="http://schemas.microsoft.com/office/drawing/2010/main" xmlns:m="http://schemas.openxmlformats.org/officeDocument/2006/math" xmlns="" val="1"/>
+              <ma14:wrappingTextBoxFlag xmlns="" xmlns:m="http://schemas.openxmlformats.org/officeDocument/2006/math" xmlns:a14="http://schemas.microsoft.com/office/drawing/2010/main" xmlns:ma14="http://schemas.microsoft.com/office/mac/drawingml/2011/main" val="1"/>
             </a:ext>
           </a:extLst>
         </p:spPr>
         <p:txBody>
           <a:bodyPr lIns="0" tIns="0" rIns="0" bIns="0">
-            <a:normAutofit/>
+            <a:normAutofit lnSpcReduction="10000"/>
           </a:bodyPr>
           <a:lstStyle/>
           <a:p>
@@ -5088,7 +5148,151 @@
               <a:rPr lang="nl-NL" dirty="0">
                 <a:latin typeface="+mn-lt"/>
               </a:rPr>
-              <a:t> data auditing.</a:t>
+              <a:t> data auditing. The package </a:t>
+            </a:r>
+            <a:r>
+              <a:rPr lang="nl-NL" dirty="0" err="1">
+                <a:latin typeface="+mn-lt"/>
+              </a:rPr>
+              <a:t>also</a:t>
+            </a:r>
+            <a:r>
+              <a:rPr lang="nl-NL" dirty="0">
+                <a:latin typeface="+mn-lt"/>
+              </a:rPr>
+              <a:t> </a:t>
+            </a:r>
+            <a:r>
+              <a:rPr lang="nl-NL" dirty="0" err="1">
+                <a:latin typeface="+mn-lt"/>
+              </a:rPr>
+              <a:t>enables</a:t>
+            </a:r>
+            <a:r>
+              <a:rPr lang="nl-NL" dirty="0">
+                <a:latin typeface="+mn-lt"/>
+              </a:rPr>
+              <a:t> users </a:t>
+            </a:r>
+            <a:r>
+              <a:rPr lang="nl-NL" dirty="0" err="1">
+                <a:latin typeface="+mn-lt"/>
+              </a:rPr>
+              <a:t>to</a:t>
+            </a:r>
+            <a:r>
+              <a:rPr lang="nl-NL" dirty="0">
+                <a:latin typeface="+mn-lt"/>
+              </a:rPr>
+              <a:t> </a:t>
+            </a:r>
+            <a:r>
+              <a:rPr lang="nl-NL" dirty="0" err="1">
+                <a:latin typeface="+mn-lt"/>
+              </a:rPr>
+              <a:t>create</a:t>
+            </a:r>
+            <a:r>
+              <a:rPr lang="nl-NL" dirty="0">
+                <a:latin typeface="+mn-lt"/>
+              </a:rPr>
+              <a:t> a prior </a:t>
+            </a:r>
+            <a:r>
+              <a:rPr lang="nl-NL" dirty="0" err="1">
+                <a:latin typeface="+mn-lt"/>
+              </a:rPr>
+              <a:t>probability</a:t>
+            </a:r>
+            <a:r>
+              <a:rPr lang="nl-NL" dirty="0">
+                <a:latin typeface="+mn-lt"/>
+              </a:rPr>
+              <a:t> </a:t>
+            </a:r>
+            <a:r>
+              <a:rPr lang="nl-NL" dirty="0" err="1">
+                <a:latin typeface="+mn-lt"/>
+              </a:rPr>
+              <a:t>distribution</a:t>
+            </a:r>
+            <a:r>
+              <a:rPr lang="nl-NL" dirty="0">
+                <a:latin typeface="+mn-lt"/>
+              </a:rPr>
+              <a:t> </a:t>
+            </a:r>
+            <a:r>
+              <a:rPr lang="nl-NL" dirty="0" err="1">
+                <a:latin typeface="+mn-lt"/>
+              </a:rPr>
+              <a:t>to</a:t>
+            </a:r>
+            <a:r>
+              <a:rPr lang="nl-NL" dirty="0">
+                <a:latin typeface="+mn-lt"/>
+              </a:rPr>
+              <a:t> </a:t>
+            </a:r>
+            <a:r>
+              <a:rPr lang="nl-NL" dirty="0" err="1">
+                <a:latin typeface="+mn-lt"/>
+              </a:rPr>
+              <a:t>perform</a:t>
+            </a:r>
+            <a:r>
+              <a:rPr lang="nl-NL" dirty="0">
+                <a:latin typeface="+mn-lt"/>
+              </a:rPr>
+              <a:t> </a:t>
+            </a:r>
+            <a:r>
+              <a:rPr lang="nl-NL" dirty="0" err="1">
+                <a:latin typeface="+mn-lt"/>
+              </a:rPr>
+              <a:t>Bayesian</a:t>
+            </a:r>
+            <a:r>
+              <a:rPr lang="nl-NL" dirty="0">
+                <a:latin typeface="+mn-lt"/>
+              </a:rPr>
+              <a:t> data </a:t>
+            </a:r>
+            <a:r>
+              <a:rPr lang="nl-NL" dirty="0" err="1">
+                <a:latin typeface="+mn-lt"/>
+              </a:rPr>
+              <a:t>auditing</a:t>
+            </a:r>
+            <a:r>
+              <a:rPr lang="nl-NL" dirty="0">
+                <a:latin typeface="+mn-lt"/>
+              </a:rPr>
+              <a:t> </a:t>
+            </a:r>
+            <a:r>
+              <a:rPr lang="nl-NL" dirty="0" err="1">
+                <a:latin typeface="+mn-lt"/>
+              </a:rPr>
+              <a:t>using</a:t>
+            </a:r>
+            <a:r>
+              <a:rPr lang="nl-NL" dirty="0">
+                <a:latin typeface="+mn-lt"/>
+              </a:rPr>
+              <a:t> these </a:t>
+            </a:r>
+            <a:r>
+              <a:rPr lang="nl-NL" dirty="0" err="1">
+                <a:latin typeface="+mn-lt"/>
+              </a:rPr>
+              <a:t>functions</a:t>
+            </a:r>
+            <a:r>
+              <a:rPr lang="nl-NL" dirty="0">
+                <a:latin typeface="+mn-lt"/>
+              </a:rPr>
+              <a:t>.</a:t>
             </a:r>
           </a:p>
           <a:p>
@@ -5485,7 +5689,7 @@
           </a:ln>
           <a:extLst>
             <a:ext uri="{C572A759-6A51-4108-AA02-DFA0A04FC94B}">
-              <ma14:wrappingTextBoxFlag xmlns:ma14="http://schemas.microsoft.com/office/mac/drawingml/2011/main" xmlns:a14="http://schemas.microsoft.com/office/drawing/2010/main" xmlns:m="http://schemas.openxmlformats.org/officeDocument/2006/math" xmlns="" val="1"/>
+              <ma14:wrappingTextBoxFlag xmlns="" xmlns:m="http://schemas.openxmlformats.org/officeDocument/2006/math" xmlns:a14="http://schemas.microsoft.com/office/drawing/2010/main" xmlns:ma14="http://schemas.microsoft.com/office/mac/drawingml/2011/main" val="1"/>
             </a:ext>
           </a:extLst>
         </p:spPr>
@@ -5850,7 +6054,29 @@
                 </a:solidFill>
                 <a:latin typeface="+mn-lt"/>
               </a:rPr>
-              <a:t> Specifies the concentration parameter of the Dirichlet prior distribution.</a:t>
+              <a:t> Specifies the </a:t>
+            </a:r>
+            <a:r>
+              <a:rPr lang="en-US" dirty="0">
+                <a:solidFill>
+                  <a:schemeClr val="tx1">
+                    <a:lumMod val="50000"/>
+                  </a:schemeClr>
+                </a:solidFill>
+                <a:latin typeface="+mn-lt"/>
+              </a:rPr>
+              <a:t>concentration</a:t>
+            </a:r>
+            <a:r>
+              <a:rPr lang="en-US" b="0" dirty="0">
+                <a:solidFill>
+                  <a:schemeClr val="tx1">
+                    <a:lumMod val="50000"/>
+                  </a:schemeClr>
+                </a:solidFill>
+                <a:latin typeface="+mn-lt"/>
+              </a:rPr>
+              <a:t> parameter of the Dirichlet prior distribution.</a:t>
             </a:r>
             <a:endParaRPr lang="en-US" b="0" dirty="0">
               <a:solidFill>
@@ -5892,7 +6118,7 @@
           <a:effectLst/>
           <a:extLst>
             <a:ext uri="{C572A759-6A51-4108-AA02-DFA0A04FC94B}">
-              <ma14:wrappingTextBoxFlag xmlns:ma14="http://schemas.microsoft.com/office/mac/drawingml/2011/main" xmlns:a14="http://schemas.microsoft.com/office/drawing/2010/main" xmlns:m="http://schemas.openxmlformats.org/officeDocument/2006/math" xmlns="" val="1"/>
+              <ma14:wrappingTextBoxFlag xmlns="" xmlns:m="http://schemas.openxmlformats.org/officeDocument/2006/math" xmlns:a14="http://schemas.microsoft.com/office/drawing/2010/main" xmlns:ma14="http://schemas.microsoft.com/office/mac/drawingml/2011/main" val="1"/>
             </a:ext>
           </a:extLst>
         </p:spPr>
@@ -6170,7 +6396,7 @@
           </a:ln>
           <a:extLst>
             <a:ext uri="{C572A759-6A51-4108-AA02-DFA0A04FC94B}">
-              <ma14:wrappingTextBoxFlag xmlns:ma14="http://schemas.microsoft.com/office/mac/drawingml/2011/main" xmlns:a14="http://schemas.microsoft.com/office/drawing/2010/main" xmlns:m="http://schemas.openxmlformats.org/officeDocument/2006/math" xmlns="" val="1"/>
+              <ma14:wrappingTextBoxFlag xmlns="" xmlns:m="http://schemas.openxmlformats.org/officeDocument/2006/math" xmlns:a14="http://schemas.microsoft.com/office/drawing/2010/main" xmlns:ma14="http://schemas.microsoft.com/office/mac/drawingml/2011/main" val="1"/>
             </a:ext>
           </a:extLst>
         </p:spPr>
@@ -6406,7 +6632,7 @@
           <a:effectLst/>
           <a:extLst>
             <a:ext uri="{C572A759-6A51-4108-AA02-DFA0A04FC94B}">
-              <ma14:wrappingTextBoxFlag xmlns="" xmlns:m="http://schemas.openxmlformats.org/officeDocument/2006/math" xmlns:a14="http://schemas.microsoft.com/office/drawing/2010/main" xmlns:ma14="http://schemas.microsoft.com/office/mac/drawingml/2011/main" xmlns:lc="http://schemas.openxmlformats.org/drawingml/2006/lockedCanvas" val="1"/>
+              <ma14:wrappingTextBoxFlag xmlns:lc="http://schemas.openxmlformats.org/drawingml/2006/lockedCanvas" xmlns:ma14="http://schemas.microsoft.com/office/mac/drawingml/2011/main" xmlns:a14="http://schemas.microsoft.com/office/drawing/2010/main" xmlns:m="http://schemas.openxmlformats.org/officeDocument/2006/math" xmlns="" val="1"/>
             </a:ext>
           </a:extLst>
         </p:spPr>
@@ -6793,7 +7019,7 @@
         </p:nvSpPr>
         <p:spPr>
           <a:xfrm>
-            <a:off x="9431232" y="7541838"/>
+            <a:off x="9431232" y="7409318"/>
             <a:ext cx="4264736" cy="0"/>
           </a:xfrm>
           <a:prstGeom prst="line">
@@ -6841,7 +7067,7 @@
         </p:nvSpPr>
         <p:spPr>
           <a:xfrm>
-            <a:off x="3430016" y="7541838"/>
+            <a:off x="3430016" y="7409318"/>
             <a:ext cx="7110861" cy="0"/>
           </a:xfrm>
           <a:prstGeom prst="line">
@@ -6890,7 +7116,7 @@
         <p:spPr>
           <a:xfrm>
             <a:off x="3515929" y="8370865"/>
-            <a:ext cx="6649048" cy="1598306"/>
+            <a:ext cx="6649048" cy="1636778"/>
           </a:xfrm>
           <a:prstGeom prst="rect">
             <a:avLst/>
@@ -6900,7 +7126,7 @@
           </a:ln>
           <a:extLst>
             <a:ext uri="{C572A759-6A51-4108-AA02-DFA0A04FC94B}">
-              <ma14:wrappingTextBoxFlag xmlns:ma14="http://schemas.microsoft.com/office/mac/drawingml/2011/main" xmlns:a14="http://schemas.microsoft.com/office/drawing/2010/main" xmlns:m="http://schemas.openxmlformats.org/officeDocument/2006/math" xmlns="" val="1"/>
+              <ma14:wrappingTextBoxFlag xmlns="" xmlns:m="http://schemas.openxmlformats.org/officeDocument/2006/math" xmlns:a14="http://schemas.microsoft.com/office/drawing/2010/main" xmlns:ma14="http://schemas.microsoft.com/office/mac/drawingml/2011/main" val="1"/>
             </a:ext>
           </a:extLst>
         </p:spPr>
@@ -7129,7 +7355,44 @@
                 </a:solidFill>
                 <a:latin typeface="+mn-lt"/>
               </a:rPr>
-              <a:t> for average frequency, but can also be </a:t>
+              <a:t> for average </a:t>
+            </a:r>
+          </a:p>
+          <a:p>
+            <a:pPr>
+              <a:lnSpc>
+                <a:spcPct val="90000"/>
+              </a:lnSpc>
+              <a:spcBef>
+                <a:spcPts val="300"/>
+              </a:spcBef>
+              <a:buClr>
+                <a:schemeClr val="accent4">
+                  <a:hueOff val="384618"/>
+                  <a:satOff val="3869"/>
+                  <a:lumOff val="5802"/>
+                </a:schemeClr>
+              </a:buClr>
+              <a:defRPr b="0">
+                <a:solidFill>
+                  <a:srgbClr val="000000"/>
+                </a:solidFill>
+                <a:latin typeface="+mn-lt"/>
+                <a:ea typeface="+mn-ea"/>
+                <a:cs typeface="+mn-cs"/>
+                <a:sym typeface="Source Sans Pro Light"/>
+              </a:defRPr>
+            </a:pPr>
+            <a:r>
+              <a:rPr lang="en-US" b="0" dirty="0">
+                <a:solidFill>
+                  <a:schemeClr val="tx1">
+                    <a:lumMod val="50000"/>
+                  </a:schemeClr>
+                </a:solidFill>
+                <a:latin typeface="+mn-lt"/>
+              </a:rPr>
+              <a:t>                          frequency but can also be </a:t>
             </a:r>
             <a:r>
               <a:rPr lang="en-US" b="0" dirty="0">
@@ -7258,7 +7521,7 @@
           </a:ln>
           <a:extLst>
             <a:ext uri="{C572A759-6A51-4108-AA02-DFA0A04FC94B}">
-              <ma14:wrappingTextBoxFlag xmlns:ma14="http://schemas.microsoft.com/office/mac/drawingml/2011/main" xmlns:a14="http://schemas.microsoft.com/office/drawing/2010/main" xmlns:m="http://schemas.openxmlformats.org/officeDocument/2006/math" xmlns="" val="1"/>
+              <ma14:wrappingTextBoxFlag xmlns="" xmlns:m="http://schemas.openxmlformats.org/officeDocument/2006/math" xmlns:a14="http://schemas.microsoft.com/office/drawing/2010/main" xmlns:ma14="http://schemas.microsoft.com/office/mac/drawingml/2011/main" val="1"/>
             </a:ext>
           </a:extLst>
         </p:spPr>
@@ -7459,7 +7722,7 @@
           <a:effectLst/>
           <a:extLst>
             <a:ext uri="{C572A759-6A51-4108-AA02-DFA0A04FC94B}">
-              <ma14:wrappingTextBoxFlag xmlns="" xmlns:m="http://schemas.openxmlformats.org/officeDocument/2006/math" xmlns:a14="http://schemas.microsoft.com/office/drawing/2010/main" xmlns:ma14="http://schemas.microsoft.com/office/mac/drawingml/2011/main" xmlns:lc="http://schemas.openxmlformats.org/drawingml/2006/lockedCanvas" val="1"/>
+              <ma14:wrappingTextBoxFlag xmlns:lc="http://schemas.openxmlformats.org/drawingml/2006/lockedCanvas" xmlns:ma14="http://schemas.microsoft.com/office/mac/drawingml/2011/main" xmlns:a14="http://schemas.microsoft.com/office/drawing/2010/main" xmlns:m="http://schemas.openxmlformats.org/officeDocument/2006/math" xmlns="" val="1"/>
             </a:ext>
           </a:extLst>
         </p:spPr>
@@ -7868,7 +8131,7 @@
           <a:effectLst/>
           <a:extLst>
             <a:ext uri="{C572A759-6A51-4108-AA02-DFA0A04FC94B}">
-              <ma14:wrappingTextBoxFlag xmlns:ma14="http://schemas.microsoft.com/office/mac/drawingml/2011/main" xmlns:a14="http://schemas.microsoft.com/office/drawing/2010/main" xmlns:m="http://schemas.openxmlformats.org/officeDocument/2006/math" xmlns="" val="1"/>
+              <ma14:wrappingTextBoxFlag xmlns="" xmlns:m="http://schemas.openxmlformats.org/officeDocument/2006/math" xmlns:a14="http://schemas.microsoft.com/office/drawing/2010/main" xmlns:ma14="http://schemas.microsoft.com/office/mac/drawingml/2011/main" val="1"/>
             </a:ext>
           </a:extLst>
         </p:spPr>
@@ -8076,7 +8339,7 @@
           </a:ln>
           <a:extLst>
             <a:ext uri="{C572A759-6A51-4108-AA02-DFA0A04FC94B}">
-              <ma14:wrappingTextBoxFlag xmlns:ma14="http://schemas.microsoft.com/office/mac/drawingml/2011/main" xmlns:a14="http://schemas.microsoft.com/office/drawing/2010/main" xmlns:m="http://schemas.openxmlformats.org/officeDocument/2006/math" xmlns="" val="1"/>
+              <ma14:wrappingTextBoxFlag xmlns="" xmlns:m="http://schemas.openxmlformats.org/officeDocument/2006/math" xmlns:a14="http://schemas.microsoft.com/office/drawing/2010/main" xmlns:ma14="http://schemas.microsoft.com/office/mac/drawingml/2011/main" val="1"/>
             </a:ext>
           </a:extLst>
         </p:spPr>
@@ -8140,7 +8403,7 @@
           </a:ln>
           <a:extLst>
             <a:ext uri="{C572A759-6A51-4108-AA02-DFA0A04FC94B}">
-              <ma14:wrappingTextBoxFlag xmlns:ma14="http://schemas.microsoft.com/office/mac/drawingml/2011/main" xmlns:a14="http://schemas.microsoft.com/office/drawing/2010/main" xmlns:m="http://schemas.openxmlformats.org/officeDocument/2006/math" xmlns="" val="1"/>
+              <ma14:wrappingTextBoxFlag xmlns="" xmlns:m="http://schemas.openxmlformats.org/officeDocument/2006/math" xmlns:a14="http://schemas.microsoft.com/office/drawing/2010/main" xmlns:ma14="http://schemas.microsoft.com/office/mac/drawingml/2011/main" val="1"/>
             </a:ext>
           </a:extLst>
         </p:spPr>
@@ -8564,7 +8827,7 @@
           </a:ln>
           <a:extLst>
             <a:ext uri="{C572A759-6A51-4108-AA02-DFA0A04FC94B}">
-              <ma14:wrappingTextBoxFlag xmlns:ma14="http://schemas.microsoft.com/office/mac/drawingml/2011/main" xmlns:a14="http://schemas.microsoft.com/office/drawing/2010/main" xmlns:m="http://schemas.openxmlformats.org/officeDocument/2006/math" xmlns="" val="1"/>
+              <ma14:wrappingTextBoxFlag xmlns="" xmlns:m="http://schemas.openxmlformats.org/officeDocument/2006/math" xmlns:a14="http://schemas.microsoft.com/office/drawing/2010/main" xmlns:ma14="http://schemas.microsoft.com/office/mac/drawingml/2011/main" val="1"/>
             </a:ext>
           </a:extLst>
         </p:spPr>
@@ -8628,7 +8891,7 @@
           </a:ln>
           <a:extLst>
             <a:ext uri="{C572A759-6A51-4108-AA02-DFA0A04FC94B}">
-              <ma14:wrappingTextBoxFlag xmlns:ma14="http://schemas.microsoft.com/office/mac/drawingml/2011/main" xmlns:a14="http://schemas.microsoft.com/office/drawing/2010/main" xmlns:m="http://schemas.openxmlformats.org/officeDocument/2006/math" xmlns="" val="1"/>
+              <ma14:wrappingTextBoxFlag xmlns="" xmlns:m="http://schemas.openxmlformats.org/officeDocument/2006/math" xmlns:a14="http://schemas.microsoft.com/office/drawing/2010/main" xmlns:ma14="http://schemas.microsoft.com/office/mac/drawingml/2011/main" val="1"/>
             </a:ext>
           </a:extLst>
         </p:spPr>
@@ -8998,7 +9261,7 @@
         </p:blipFill>
         <p:spPr>
           <a:xfrm>
-            <a:off x="3610392" y="4785809"/>
+            <a:off x="3610392" y="4829315"/>
             <a:ext cx="3050921" cy="2090671"/>
           </a:xfrm>
           <a:prstGeom prst="rect">
@@ -9028,7 +9291,7 @@
         </p:blipFill>
         <p:spPr>
           <a:xfrm>
-            <a:off x="7106853" y="4798372"/>
+            <a:off x="7102868" y="4850931"/>
             <a:ext cx="3037122" cy="2062391"/>
           </a:xfrm>
           <a:prstGeom prst="rect">
@@ -9072,7 +9335,7 @@
           <a:effectLst/>
           <a:extLst>
             <a:ext uri="{C572A759-6A51-4108-AA02-DFA0A04FC94B}">
-              <ma14:wrappingTextBoxFlag xmlns:ma14="http://schemas.microsoft.com/office/mac/drawingml/2011/main" xmlns:a14="http://schemas.microsoft.com/office/drawing/2010/main" xmlns:m="http://schemas.openxmlformats.org/officeDocument/2006/math" xmlns="" val="1"/>
+              <ma14:wrappingTextBoxFlag xmlns="" xmlns:m="http://schemas.openxmlformats.org/officeDocument/2006/math" xmlns:a14="http://schemas.microsoft.com/office/drawing/2010/main" xmlns:ma14="http://schemas.microsoft.com/office/mac/drawingml/2011/main" val="1"/>
             </a:ext>
           </a:extLst>
         </p:spPr>
@@ -9099,38 +9362,32 @@
             <a:r>
               <a:rPr lang="nl-NL" sz="1000" dirty="0">
                 <a:solidFill>
-                  <a:schemeClr val="tx1">
-                    <a:lumMod val="50000"/>
-                  </a:schemeClr>
+                  <a:srgbClr val="4B886B"/>
                 </a:solidFill>
                 <a:latin typeface="Courier New" panose="02070309020205020404" pitchFamily="49" charset="0"/>
                 <a:cs typeface="Courier New" panose="02070309020205020404" pitchFamily="49" charset="0"/>
               </a:rPr>
-              <a:t>plot(..., type = '</a:t>
+              <a:t># </a:t>
             </a:r>
             <a:r>
               <a:rPr lang="nl-NL" sz="1000" dirty="0" err="1">
                 <a:solidFill>
-                  <a:schemeClr val="tx1">
-                    <a:lumMod val="50000"/>
-                  </a:schemeClr>
+                  <a:srgbClr val="4B886B"/>
                 </a:solidFill>
                 <a:latin typeface="Courier New" panose="02070309020205020404" pitchFamily="49" charset="0"/>
                 <a:cs typeface="Courier New" panose="02070309020205020404" pitchFamily="49" charset="0"/>
               </a:rPr>
-              <a:t>sequential</a:t>
+              <a:t>requires</a:t>
             </a:r>
             <a:r>
               <a:rPr lang="nl-NL" sz="1000" dirty="0">
                 <a:solidFill>
-                  <a:schemeClr val="tx1">
-                    <a:lumMod val="50000"/>
-                  </a:schemeClr>
+                  <a:srgbClr val="4B886B"/>
                 </a:solidFill>
                 <a:latin typeface="Courier New" panose="02070309020205020404" pitchFamily="49" charset="0"/>
                 <a:cs typeface="Courier New" panose="02070309020205020404" pitchFamily="49" charset="0"/>
               </a:rPr>
-              <a:t>')</a:t>
+              <a:t> 'prior = TRUE'</a:t>
             </a:r>
           </a:p>
           <a:p>
@@ -9148,15 +9405,42 @@
                 <a:sym typeface="Menlo"/>
               </a:defRPr>
             </a:pPr>
-            <a:endParaRPr lang="nl-NL" sz="1000" dirty="0">
-              <a:solidFill>
-                <a:schemeClr val="tx1">
-                  <a:lumMod val="50000"/>
-                </a:schemeClr>
-              </a:solidFill>
-              <a:latin typeface="Courier New" panose="02070309020205020404" pitchFamily="49" charset="0"/>
-              <a:cs typeface="Courier New" panose="02070309020205020404" pitchFamily="49" charset="0"/>
-            </a:endParaRPr>
+            <a:r>
+              <a:rPr lang="nl-NL" sz="1000" dirty="0">
+                <a:solidFill>
+                  <a:schemeClr val="tx1">
+                    <a:lumMod val="50000"/>
+                  </a:schemeClr>
+                </a:solidFill>
+                <a:latin typeface="Courier New" panose="02070309020205020404" pitchFamily="49" charset="0"/>
+                <a:cs typeface="Courier New" panose="02070309020205020404" pitchFamily="49" charset="0"/>
+              </a:rPr>
+              <a:t>plot(..., type = '</a:t>
+            </a:r>
+            <a:r>
+              <a:rPr lang="nl-NL" sz="1000" dirty="0" err="1">
+                <a:solidFill>
+                  <a:schemeClr val="tx1">
+                    <a:lumMod val="50000"/>
+                  </a:schemeClr>
+                </a:solidFill>
+                <a:latin typeface="Courier New" panose="02070309020205020404" pitchFamily="49" charset="0"/>
+                <a:cs typeface="Courier New" panose="02070309020205020404" pitchFamily="49" charset="0"/>
+              </a:rPr>
+              <a:t>sequential</a:t>
+            </a:r>
+            <a:r>
+              <a:rPr lang="nl-NL" sz="1000" dirty="0">
+                <a:solidFill>
+                  <a:schemeClr val="tx1">
+                    <a:lumMod val="50000"/>
+                  </a:schemeClr>
+                </a:solidFill>
+                <a:latin typeface="Courier New" panose="02070309020205020404" pitchFamily="49" charset="0"/>
+                <a:cs typeface="Courier New" panose="02070309020205020404" pitchFamily="49" charset="0"/>
+              </a:rPr>
+              <a:t>')</a:t>
+            </a:r>
           </a:p>
           <a:p>
             <a:pPr>
@@ -9532,7 +9816,7 @@
         </p:blipFill>
         <p:spPr>
           <a:xfrm>
-            <a:off x="10590833" y="4817278"/>
+            <a:off x="10590833" y="4848084"/>
             <a:ext cx="3035253" cy="2061121"/>
           </a:xfrm>
           <a:prstGeom prst="rect">

</xml_diff>